<commit_message>
Updating presentation-1 to include bananometer exercise, updating font on presentation-2, presentation-2 still not complete
</commit_message>
<xml_diff>
--- a/Presentation-2/AI-Presentation-2.pptx
+++ b/Presentation-2/AI-Presentation-2.pptx
@@ -115,6 +115,11 @@
       </a:defRPr>
     </a:lvl9pPr>
   </p:defaultTextStyle>
+  <p:extLst>
+    <p:ext uri="{EFAFB233-063F-42B5-8137-9DF3F51BA10A}">
+      <p15:sldGuideLst xmlns:p15="http://schemas.microsoft.com/office/powerpoint/2012/main"/>
+    </p:ext>
+  </p:extLst>
 </p:presentation>
 </file>
 
@@ -4799,18 +4804,26 @@
           <a:p>
             <a:pPr algn="l"/>
             <a:r>
-              <a:rPr lang="mn-MN" b="1" dirty="0"/>
+              <a:rPr lang="mn-MN" b="1" dirty="0">
+                <a:latin typeface=""/>
+              </a:rPr>
               <a:t>Хэрвээ програм бичиж сурж байгаа бол </a:t>
             </a:r>
             <a:r>
-              <a:rPr lang="en-US" b="1" dirty="0" err="1"/>
+              <a:rPr lang="en-US" b="1" dirty="0" err="1">
+                <a:latin typeface=""/>
+              </a:rPr>
               <a:t>и</a:t>
             </a:r>
             <a:r>
-              <a:rPr lang="mn-MN" b="1" dirty="0"/>
+              <a:rPr lang="mn-MN" b="1" dirty="0">
+                <a:latin typeface=""/>
+              </a:rPr>
               <a:t>йм зүйл хийж байж магадгүй:</a:t>
             </a:r>
-            <a:endParaRPr lang="en-US" b="1" dirty="0"/>
+            <a:endParaRPr lang="en-US" b="1" dirty="0">
+              <a:latin typeface=""/>
+            </a:endParaRPr>
           </a:p>
         </p:txBody>
       </p:sp>
@@ -4880,18 +4893,26 @@
           <a:p>
             <a:pPr algn="l"/>
             <a:r>
-              <a:rPr lang="mn-MN" b="1" dirty="0"/>
+              <a:rPr lang="mn-MN" b="1" dirty="0">
+                <a:latin typeface=""/>
+              </a:rPr>
               <a:t>Хэрвээ програм бичиж сурж байгаа бол </a:t>
             </a:r>
             <a:r>
-              <a:rPr lang="en-US" b="1" dirty="0" err="1"/>
+              <a:rPr lang="en-US" b="1" dirty="0" err="1">
+                <a:latin typeface=""/>
+              </a:rPr>
               <a:t>и</a:t>
             </a:r>
             <a:r>
-              <a:rPr lang="mn-MN" b="1" dirty="0"/>
+              <a:rPr lang="mn-MN" b="1" dirty="0">
+                <a:latin typeface=""/>
+              </a:rPr>
               <a:t>йм зүйл хийж байж магадгүй:</a:t>
             </a:r>
-            <a:endParaRPr lang="en-US" b="1" dirty="0"/>
+            <a:endParaRPr lang="en-US" b="1" dirty="0">
+              <a:latin typeface=""/>
+            </a:endParaRPr>
           </a:p>
         </p:txBody>
       </p:sp>
@@ -4920,7 +4941,7 @@
         </p:spPr>
         <p:txBody>
           <a:bodyPr vert="horz" lIns="91440" tIns="45720" rIns="91440" bIns="45720" rtlCol="0">
-            <a:normAutofit fontScale="92500"/>
+            <a:normAutofit fontScale="92500" lnSpcReduction="20000"/>
           </a:bodyPr>
           <a:lstStyle>
             <a:lvl1pPr marL="0" indent="0" algn="ctr" defTabSz="914400" rtl="0" eaLnBrk="1" latinLnBrk="0" hangingPunct="1">
@@ -5088,14 +5109,20 @@
           </a:lstStyle>
           <a:p>
             <a:r>
-              <a:rPr lang="en-US" i="1" dirty="0" err="1"/>
+              <a:rPr lang="en-US" i="1" dirty="0" err="1">
+                <a:latin typeface=""/>
+              </a:rPr>
               <a:t>Т</a:t>
             </a:r>
             <a:r>
-              <a:rPr lang="mn-MN" i="1" dirty="0"/>
+              <a:rPr lang="mn-MN" i="1" dirty="0">
+                <a:latin typeface=""/>
+              </a:rPr>
               <a:t>екст дотор байгаа хоёр үсэг болгоны хоёр дахийг нь томоор болгох функц бич</a:t>
             </a:r>
-            <a:endParaRPr lang="en-US" i="1" dirty="0"/>
+            <a:endParaRPr lang="en-US" i="1" dirty="0">
+              <a:latin typeface=""/>
+            </a:endParaRPr>
           </a:p>
         </p:txBody>
       </p:sp>
@@ -5165,18 +5192,26 @@
           <a:p>
             <a:pPr algn="l"/>
             <a:r>
-              <a:rPr lang="mn-MN" b="1" dirty="0"/>
+              <a:rPr lang="mn-MN" b="1" dirty="0">
+                <a:latin typeface=""/>
+              </a:rPr>
               <a:t>Хэрвээ програм бичиж сурж байгаа бол </a:t>
             </a:r>
             <a:r>
-              <a:rPr lang="en-US" b="1" dirty="0" err="1"/>
+              <a:rPr lang="en-US" b="1" dirty="0" err="1">
+                <a:latin typeface=""/>
+              </a:rPr>
               <a:t>и</a:t>
             </a:r>
             <a:r>
-              <a:rPr lang="mn-MN" b="1" dirty="0"/>
+              <a:rPr lang="mn-MN" b="1" dirty="0">
+                <a:latin typeface=""/>
+              </a:rPr>
               <a:t>йм зүйл хийж байж магадгүй:</a:t>
             </a:r>
-            <a:endParaRPr lang="en-US" b="1" dirty="0"/>
+            <a:endParaRPr lang="en-US" b="1" dirty="0">
+              <a:latin typeface=""/>
+            </a:endParaRPr>
           </a:p>
         </p:txBody>
       </p:sp>
@@ -5205,7 +5240,7 @@
         </p:spPr>
         <p:txBody>
           <a:bodyPr vert="horz" lIns="91440" tIns="45720" rIns="91440" bIns="45720" rtlCol="0">
-            <a:normAutofit fontScale="92500"/>
+            <a:normAutofit fontScale="92500" lnSpcReduction="20000"/>
           </a:bodyPr>
           <a:lstStyle>
             <a:lvl1pPr marL="0" indent="0" algn="ctr" defTabSz="914400" rtl="0" eaLnBrk="1" latinLnBrk="0" hangingPunct="1">
@@ -5373,14 +5408,20 @@
           </a:lstStyle>
           <a:p>
             <a:r>
-              <a:rPr lang="en-US" i="1" dirty="0" err="1"/>
+              <a:rPr lang="en-US" i="1" dirty="0" err="1">
+                <a:latin typeface=""/>
+              </a:rPr>
               <a:t>Т</a:t>
             </a:r>
             <a:r>
-              <a:rPr lang="mn-MN" i="1" dirty="0"/>
+              <a:rPr lang="mn-MN" i="1" dirty="0">
+                <a:latin typeface=""/>
+              </a:rPr>
               <a:t>екст дотор байгаа хоёр үсэг болгоны хоёр дахийг нь томоор болгох функц бич</a:t>
             </a:r>
-            <a:endParaRPr lang="en-US" i="1" dirty="0"/>
+            <a:endParaRPr lang="en-US" i="1" dirty="0">
+              <a:latin typeface=""/>
+            </a:endParaRPr>
           </a:p>
         </p:txBody>
       </p:sp>
@@ -5681,18 +5722,26 @@
           <a:p>
             <a:pPr algn="l"/>
             <a:r>
-              <a:rPr lang="mn-MN" b="1" dirty="0"/>
+              <a:rPr lang="mn-MN" b="1" dirty="0">
+                <a:latin typeface=""/>
+              </a:rPr>
               <a:t>Хэрвээ програм бичиж сурж байгаа бол </a:t>
             </a:r>
             <a:r>
-              <a:rPr lang="en-US" b="1" dirty="0" err="1"/>
+              <a:rPr lang="en-US" b="1" dirty="0" err="1">
+                <a:latin typeface=""/>
+              </a:rPr>
               <a:t>и</a:t>
             </a:r>
             <a:r>
-              <a:rPr lang="mn-MN" b="1" dirty="0"/>
+              <a:rPr lang="mn-MN" b="1" dirty="0">
+                <a:latin typeface=""/>
+              </a:rPr>
               <a:t>йм зүйл хийж байж магадгүй:</a:t>
             </a:r>
-            <a:endParaRPr lang="en-US" b="1" dirty="0"/>
+            <a:endParaRPr lang="en-US" b="1" dirty="0">
+              <a:latin typeface=""/>
+            </a:endParaRPr>
           </a:p>
         </p:txBody>
       </p:sp>
@@ -5721,7 +5770,7 @@
         </p:spPr>
         <p:txBody>
           <a:bodyPr vert="horz" lIns="91440" tIns="45720" rIns="91440" bIns="45720" rtlCol="0">
-            <a:normAutofit fontScale="92500"/>
+            <a:normAutofit fontScale="92500" lnSpcReduction="20000"/>
           </a:bodyPr>
           <a:lstStyle>
             <a:lvl1pPr marL="0" indent="0" algn="ctr" defTabSz="914400" rtl="0" eaLnBrk="1" latinLnBrk="0" hangingPunct="1">
@@ -5889,14 +5938,20 @@
           </a:lstStyle>
           <a:p>
             <a:r>
-              <a:rPr lang="en-US" i="1" dirty="0" err="1"/>
+              <a:rPr lang="en-US" i="1" dirty="0" err="1">
+                <a:latin typeface=""/>
+              </a:rPr>
               <a:t>Т</a:t>
             </a:r>
             <a:r>
-              <a:rPr lang="mn-MN" i="1" dirty="0"/>
+              <a:rPr lang="mn-MN" i="1" dirty="0">
+                <a:latin typeface=""/>
+              </a:rPr>
               <a:t>екст дотор байгаа хоёр үсэг болгоны хоёр дахийг нь томоор болгох функц бич</a:t>
             </a:r>
-            <a:endParaRPr lang="en-US" i="1" dirty="0"/>
+            <a:endParaRPr lang="en-US" i="1" dirty="0">
+              <a:latin typeface=""/>
+            </a:endParaRPr>
           </a:p>
         </p:txBody>
       </p:sp>
@@ -7472,10 +7527,14 @@
           <a:p>
             <a:pPr algn="l"/>
             <a:r>
-              <a:rPr lang="mn-MN" b="1" dirty="0"/>
+              <a:rPr lang="mn-MN" b="1" dirty="0">
+                <a:latin typeface=""/>
+              </a:rPr>
               <a:t>Хэрхэн яаж ийм зүйл хийх програм бичих вэ?</a:t>
             </a:r>
-            <a:endParaRPr lang="en-US" b="1" dirty="0"/>
+            <a:endParaRPr lang="en-US" b="1" dirty="0">
+              <a:latin typeface=""/>
+            </a:endParaRPr>
           </a:p>
         </p:txBody>
       </p:sp>

</xml_diff>